<commit_message>
Fixed homeworks in slides 5
</commit_message>
<xml_diff>
--- a/Lesson slides/Unit 5 - Graphs.pptx
+++ b/Lesson slides/Unit 5 - Graphs.pptx
@@ -255,7 +255,7 @@
           <a:p>
             <a:fld id="{F314420D-16BA-4EDC-9A71-800590EAD5A3}" type="datetimeFigureOut">
               <a:rPr lang="en-GB" smtClean="0"/>
-              <a:t>05/10/2017</a:t>
+              <a:t>19/12/2017</a:t>
             </a:fld>
             <a:endParaRPr lang="en-GB"/>
           </a:p>
@@ -414,7 +414,7 @@
           <a:p>
             <a:fld id="{29573B9A-66FB-4A63-BCD5-E140B9429FD2}" type="slidenum">
               <a:rPr lang="en-GB" smtClean="0"/>
-              <a:t>‹nr.›</a:t>
+              <a:t>‹#›</a:t>
             </a:fld>
             <a:endParaRPr lang="en-GB"/>
           </a:p>
@@ -2722,7 +2722,7 @@
           <a:p>
             <a:fld id="{6D0056B2-4F08-4129-BC21-E4EE9138FBBD}" type="datetime1">
               <a:rPr lang="en-GB" smtClean="0"/>
-              <a:t>05/10/2017</a:t>
+              <a:t>19/12/2017</a:t>
             </a:fld>
             <a:endParaRPr lang="en-GB"/>
           </a:p>
@@ -2768,7 +2768,7 @@
           <a:p>
             <a:fld id="{A3AAA307-BC5C-435E-9F75-3D6007B651A5}" type="slidenum">
               <a:rPr lang="en-GB" smtClean="0"/>
-              <a:t>‹nr.›</a:t>
+              <a:t>‹#›</a:t>
             </a:fld>
             <a:endParaRPr lang="en-GB"/>
           </a:p>
@@ -2977,7 +2977,7 @@
           <a:p>
             <a:fld id="{612D572C-2764-414E-9C89-DDD42C6B07C1}" type="datetime1">
               <a:rPr lang="en-GB" smtClean="0"/>
-              <a:t>05/10/2017</a:t>
+              <a:t>19/12/2017</a:t>
             </a:fld>
             <a:endParaRPr lang="en-GB"/>
           </a:p>
@@ -3023,7 +3023,7 @@
           <a:p>
             <a:fld id="{A3AAA307-BC5C-435E-9F75-3D6007B651A5}" type="slidenum">
               <a:rPr lang="en-GB" smtClean="0"/>
-              <a:t>‹nr.›</a:t>
+              <a:t>‹#›</a:t>
             </a:fld>
             <a:endParaRPr lang="en-GB"/>
           </a:p>
@@ -3295,7 +3295,7 @@
           <a:p>
             <a:fld id="{2F9DEDFE-25E5-4177-B37C-03C25AABCBD5}" type="datetime1">
               <a:rPr lang="en-GB" smtClean="0"/>
-              <a:t>05/10/2017</a:t>
+              <a:t>19/12/2017</a:t>
             </a:fld>
             <a:endParaRPr lang="en-GB"/>
           </a:p>
@@ -3341,7 +3341,7 @@
           <a:p>
             <a:fld id="{A3AAA307-BC5C-435E-9F75-3D6007B651A5}" type="slidenum">
               <a:rPr lang="en-GB" smtClean="0"/>
-              <a:t>‹nr.›</a:t>
+              <a:t>‹#›</a:t>
             </a:fld>
             <a:endParaRPr lang="en-GB"/>
           </a:p>
@@ -3626,7 +3626,7 @@
           <a:p>
             <a:fld id="{09077836-4222-4E87-A3F7-BF9743D61C38}" type="datetime1">
               <a:rPr lang="en-GB" smtClean="0"/>
-              <a:t>05/10/2017</a:t>
+              <a:t>19/12/2017</a:t>
             </a:fld>
             <a:endParaRPr lang="en-GB"/>
           </a:p>
@@ -3672,7 +3672,7 @@
           <a:p>
             <a:fld id="{A3AAA307-BC5C-435E-9F75-3D6007B651A5}" type="slidenum">
               <a:rPr lang="en-GB" smtClean="0"/>
-              <a:t>‹nr.›</a:t>
+              <a:t>‹#›</a:t>
             </a:fld>
             <a:endParaRPr lang="en-GB"/>
           </a:p>
@@ -3944,7 +3944,7 @@
           <a:p>
             <a:fld id="{5982107C-A272-44F7-BB13-558FCEBC42B2}" type="datetime1">
               <a:rPr lang="en-GB" smtClean="0"/>
-              <a:t>05/10/2017</a:t>
+              <a:t>19/12/2017</a:t>
             </a:fld>
             <a:endParaRPr lang="en-GB"/>
           </a:p>
@@ -3990,7 +3990,7 @@
           <a:p>
             <a:fld id="{A3AAA307-BC5C-435E-9F75-3D6007B651A5}" type="slidenum">
               <a:rPr lang="en-GB" smtClean="0"/>
-              <a:t>‹nr.›</a:t>
+              <a:t>‹#›</a:t>
             </a:fld>
             <a:endParaRPr lang="en-GB"/>
           </a:p>
@@ -4335,7 +4335,7 @@
           <a:p>
             <a:fld id="{F9658BBA-9690-4900-AE7A-80E9850FB3EA}" type="datetime1">
               <a:rPr lang="en-GB" smtClean="0"/>
-              <a:t>05/10/2017</a:t>
+              <a:t>19/12/2017</a:t>
             </a:fld>
             <a:endParaRPr lang="en-GB"/>
           </a:p>
@@ -4381,7 +4381,7 @@
           <a:p>
             <a:fld id="{A3AAA307-BC5C-435E-9F75-3D6007B651A5}" type="slidenum">
               <a:rPr lang="en-GB" smtClean="0"/>
-              <a:t>‹nr.›</a:t>
+              <a:t>‹#›</a:t>
             </a:fld>
             <a:endParaRPr lang="en-GB"/>
           </a:p>
@@ -4509,7 +4509,7 @@
           <a:p>
             <a:fld id="{BEB6CA79-FB04-4AE1-90FD-D2D3D2AAEEC1}" type="datetime1">
               <a:rPr lang="en-GB" smtClean="0"/>
-              <a:t>05/10/2017</a:t>
+              <a:t>19/12/2017</a:t>
             </a:fld>
             <a:endParaRPr lang="en-GB"/>
           </a:p>
@@ -4555,7 +4555,7 @@
           <a:p>
             <a:fld id="{A3AAA307-BC5C-435E-9F75-3D6007B651A5}" type="slidenum">
               <a:rPr lang="en-GB" smtClean="0"/>
-              <a:t>‹nr.›</a:t>
+              <a:t>‹#›</a:t>
             </a:fld>
             <a:endParaRPr lang="en-GB"/>
           </a:p>
@@ -4693,7 +4693,7 @@
           <a:p>
             <a:fld id="{6C950542-9F3C-4D20-A3AE-6E02D3EC84EE}" type="datetime1">
               <a:rPr lang="en-GB" smtClean="0"/>
-              <a:t>05/10/2017</a:t>
+              <a:t>19/12/2017</a:t>
             </a:fld>
             <a:endParaRPr lang="en-GB"/>
           </a:p>
@@ -4739,7 +4739,7 @@
           <a:p>
             <a:fld id="{A3AAA307-BC5C-435E-9F75-3D6007B651A5}" type="slidenum">
               <a:rPr lang="en-GB" smtClean="0"/>
-              <a:t>‹nr.›</a:t>
+              <a:t>‹#›</a:t>
             </a:fld>
             <a:endParaRPr lang="en-GB"/>
           </a:p>
@@ -4867,7 +4867,7 @@
           <a:p>
             <a:fld id="{F58B147D-FA68-4708-8C51-0F326ACB9AAA}" type="datetime1">
               <a:rPr lang="en-GB" smtClean="0"/>
-              <a:t>05/10/2017</a:t>
+              <a:t>19/12/2017</a:t>
             </a:fld>
             <a:endParaRPr lang="en-GB"/>
           </a:p>
@@ -4913,7 +4913,7 @@
           <a:p>
             <a:fld id="{A3AAA307-BC5C-435E-9F75-3D6007B651A5}" type="slidenum">
               <a:rPr lang="en-GB" smtClean="0"/>
-              <a:t>‹nr.›</a:t>
+              <a:t>‹#›</a:t>
             </a:fld>
             <a:endParaRPr lang="en-GB"/>
           </a:p>
@@ -5118,7 +5118,7 @@
           <a:p>
             <a:fld id="{0075BD33-8D5F-4D67-8F67-B28D0B7F2F08}" type="datetime1">
               <a:rPr lang="en-GB" smtClean="0"/>
-              <a:t>05/10/2017</a:t>
+              <a:t>19/12/2017</a:t>
             </a:fld>
             <a:endParaRPr lang="en-GB"/>
           </a:p>
@@ -5164,7 +5164,7 @@
           <a:p>
             <a:fld id="{A3AAA307-BC5C-435E-9F75-3D6007B651A5}" type="slidenum">
               <a:rPr lang="en-GB" smtClean="0"/>
-              <a:t>‹nr.›</a:t>
+              <a:t>‹#›</a:t>
             </a:fld>
             <a:endParaRPr lang="en-GB"/>
           </a:p>
@@ -5354,7 +5354,7 @@
           <a:p>
             <a:fld id="{633BF77B-1C97-4E77-BD1D-75274F40FC5B}" type="datetime1">
               <a:rPr lang="en-GB" smtClean="0"/>
-              <a:t>05/10/2017</a:t>
+              <a:t>19/12/2017</a:t>
             </a:fld>
             <a:endParaRPr lang="en-GB"/>
           </a:p>
@@ -5400,7 +5400,7 @@
           <a:p>
             <a:fld id="{A3AAA307-BC5C-435E-9F75-3D6007B651A5}" type="slidenum">
               <a:rPr lang="en-GB" smtClean="0"/>
-              <a:t>‹nr.›</a:t>
+              <a:t>‹#›</a:t>
             </a:fld>
             <a:endParaRPr lang="en-GB"/>
           </a:p>
@@ -5732,7 +5732,7 @@
           <a:p>
             <a:fld id="{5153D374-1A43-4F28-8430-6675858FE949}" type="datetime1">
               <a:rPr lang="en-GB" smtClean="0"/>
-              <a:t>05/10/2017</a:t>
+              <a:t>19/12/2017</a:t>
             </a:fld>
             <a:endParaRPr lang="en-GB"/>
           </a:p>
@@ -5778,7 +5778,7 @@
           <a:p>
             <a:fld id="{A3AAA307-BC5C-435E-9F75-3D6007B651A5}" type="slidenum">
               <a:rPr lang="en-GB" smtClean="0"/>
-              <a:t>‹nr.›</a:t>
+              <a:t>‹#›</a:t>
             </a:fld>
             <a:endParaRPr lang="en-GB"/>
           </a:p>
@@ -5859,7 +5859,7 @@
           <a:p>
             <a:fld id="{BA88CCDF-626B-4668-97DC-5A1BBEAB0A11}" type="datetime1">
               <a:rPr lang="en-GB" smtClean="0"/>
-              <a:t>05/10/2017</a:t>
+              <a:t>19/12/2017</a:t>
             </a:fld>
             <a:endParaRPr lang="en-GB"/>
           </a:p>
@@ -5905,7 +5905,7 @@
           <a:p>
             <a:fld id="{A3AAA307-BC5C-435E-9F75-3D6007B651A5}" type="slidenum">
               <a:rPr lang="en-GB" smtClean="0"/>
-              <a:t>‹nr.›</a:t>
+              <a:t>‹#›</a:t>
             </a:fld>
             <a:endParaRPr lang="en-GB"/>
           </a:p>
@@ -5958,7 +5958,7 @@
           <a:p>
             <a:fld id="{9760674D-D2B9-4AE0-923F-2202F9433AF2}" type="datetime1">
               <a:rPr lang="en-GB" smtClean="0"/>
-              <a:t>05/10/2017</a:t>
+              <a:t>19/12/2017</a:t>
             </a:fld>
             <a:endParaRPr lang="en-GB"/>
           </a:p>
@@ -6004,7 +6004,7 @@
           <a:p>
             <a:fld id="{A3AAA307-BC5C-435E-9F75-3D6007B651A5}" type="slidenum">
               <a:rPr lang="en-GB" smtClean="0"/>
-              <a:t>‹nr.›</a:t>
+              <a:t>‹#›</a:t>
             </a:fld>
             <a:endParaRPr lang="en-GB"/>
           </a:p>
@@ -6217,7 +6217,7 @@
           <a:p>
             <a:fld id="{319B5FBB-5ECE-4C54-9CCE-31F728E781A0}" type="datetime1">
               <a:rPr lang="en-GB" smtClean="0"/>
-              <a:t>05/10/2017</a:t>
+              <a:t>19/12/2017</a:t>
             </a:fld>
             <a:endParaRPr lang="en-GB"/>
           </a:p>
@@ -6263,7 +6263,7 @@
           <a:p>
             <a:fld id="{A3AAA307-BC5C-435E-9F75-3D6007B651A5}" type="slidenum">
               <a:rPr lang="en-GB" smtClean="0"/>
-              <a:t>‹nr.›</a:t>
+              <a:t>‹#›</a:t>
             </a:fld>
             <a:endParaRPr lang="en-GB"/>
           </a:p>
@@ -6484,7 +6484,7 @@
           <a:p>
             <a:fld id="{73C6F11D-3D21-4E28-9384-DA37B819A935}" type="datetime1">
               <a:rPr lang="en-GB" smtClean="0"/>
-              <a:t>05/10/2017</a:t>
+              <a:t>19/12/2017</a:t>
             </a:fld>
             <a:endParaRPr lang="en-GB"/>
           </a:p>
@@ -6530,7 +6530,7 @@
           <a:p>
             <a:fld id="{A3AAA307-BC5C-435E-9F75-3D6007B651A5}" type="slidenum">
               <a:rPr lang="en-GB" smtClean="0"/>
-              <a:t>‹nr.›</a:t>
+              <a:t>‹#›</a:t>
             </a:fld>
             <a:endParaRPr lang="en-GB"/>
           </a:p>
@@ -7233,7 +7233,7 @@
           <a:p>
             <a:fld id="{89F71666-4645-43A7-8D49-9FF37F68D6E1}" type="datetime1">
               <a:rPr lang="en-GB" smtClean="0"/>
-              <a:t>05/10/2017</a:t>
+              <a:t>19/12/2017</a:t>
             </a:fld>
             <a:endParaRPr lang="en-GB"/>
           </a:p>
@@ -7315,7 +7315,7 @@
           <a:p>
             <a:fld id="{A3AAA307-BC5C-435E-9F75-3D6007B651A5}" type="slidenum">
               <a:rPr lang="en-GB" smtClean="0"/>
-              <a:t>‹nr.›</a:t>
+              <a:t>‹#›</a:t>
             </a:fld>
             <a:endParaRPr lang="en-GB"/>
           </a:p>
@@ -38664,8 +38664,8 @@
           </a:p>
         </p:txBody>
       </p:sp>
-      <mc:AlternateContent xmlns:mc="http://schemas.openxmlformats.org/markup-compatibility/2006">
-        <mc:Choice xmlns:a14="http://schemas.microsoft.com/office/drawing/2010/main" Requires="a14">
+      <mc:AlternateContent xmlns:mc="http://schemas.openxmlformats.org/markup-compatibility/2006" xmlns:a14="http://schemas.microsoft.com/office/drawing/2010/main">
+        <mc:Choice Requires="a14">
           <p:sp>
             <p:nvSpPr>
               <p:cNvPr id="3" name="Tijdelijke aanduiding voor inhoud 2">
@@ -38956,7 +38956,7 @@
             </p:txBody>
           </p:sp>
         </mc:Choice>
-        <mc:Fallback>
+        <mc:Fallback xmlns="">
           <p:sp>
             <p:nvSpPr>
               <p:cNvPr id="3" name="Tijdelijke aanduiding voor inhoud 2">
@@ -39106,16 +39106,6 @@
             </a:endParaRPr>
           </a:p>
           <a:p>
-            <a:r>
-              <a:rPr lang="en-GB" b="1" i="1" dirty="0">
-                <a:solidFill>
-                  <a:srgbClr val="FF0000"/>
-                </a:solidFill>
-              </a:rPr>
-              <a:t>GO ON WITH THE ASSIGNMENT!!!</a:t>
-            </a:r>
-          </a:p>
-          <a:p>
             <a:pPr lvl="1"/>
             <a:r>
               <a:rPr lang="en-GB" i="1" dirty="0">
@@ -39123,87 +39113,48 @@
                   <a:schemeClr val="tx1"/>
                 </a:solidFill>
               </a:rPr>
-              <a:t>Exercise 1 should be </a:t>
-            </a:r>
+              <a:t>Implement the BFS algorithm</a:t>
+            </a:r>
+            <a:endParaRPr lang="en-GB" b="1" i="1" dirty="0">
+              <a:solidFill>
+                <a:schemeClr val="tx1"/>
+              </a:solidFill>
+            </a:endParaRPr>
+          </a:p>
+          <a:p>
+            <a:pPr lvl="1"/>
+            <a:r>
+              <a:rPr lang="en-GB" i="1" dirty="0">
+                <a:solidFill>
+                  <a:schemeClr val="tx1"/>
+                </a:solidFill>
+              </a:rPr>
+              <a:t>Implement the DFS algorithm</a:t>
+            </a:r>
+          </a:p>
+          <a:p>
+            <a:pPr lvl="1"/>
             <a:r>
               <a:rPr lang="en-GB" b="1" i="1" dirty="0">
                 <a:solidFill>
                   <a:schemeClr val="tx1"/>
                 </a:solidFill>
               </a:rPr>
-              <a:t>completed</a:t>
-            </a:r>
-          </a:p>
-          <a:p>
-            <a:pPr lvl="1"/>
-            <a:r>
-              <a:rPr lang="en-GB" i="1" dirty="0">
+              <a:t>Implement </a:t>
+            </a:r>
+            <a:r>
+              <a:rPr lang="en-GB" b="1" i="1">
                 <a:solidFill>
                   <a:schemeClr val="tx1"/>
                 </a:solidFill>
               </a:rPr>
-              <a:t>Exercise 2 should be </a:t>
-            </a:r>
-            <a:r>
-              <a:rPr lang="en-GB" b="1" i="1" dirty="0">
-                <a:solidFill>
-                  <a:schemeClr val="tx1"/>
-                </a:solidFill>
-              </a:rPr>
-              <a:t>in progress</a:t>
-            </a:r>
-          </a:p>
-          <a:p>
-            <a:pPr lvl="2"/>
-            <a:r>
-              <a:rPr lang="en-GB" dirty="0">
-                <a:solidFill>
-                  <a:schemeClr val="tx1"/>
-                </a:solidFill>
-              </a:rPr>
-              <a:t>Tip: look for binary tree code from N@tschool, as inspiration</a:t>
-            </a:r>
-          </a:p>
-          <a:p>
-            <a:pPr lvl="1"/>
-            <a:r>
-              <a:rPr lang="en-GB" i="1" dirty="0">
-                <a:solidFill>
-                  <a:schemeClr val="tx1"/>
-                </a:solidFill>
-              </a:rPr>
-              <a:t>[for the fastest] Exercise 3 can now be </a:t>
-            </a:r>
-            <a:r>
-              <a:rPr lang="en-GB" b="1" i="1" dirty="0">
-                <a:solidFill>
-                  <a:schemeClr val="tx1"/>
-                </a:solidFill>
-              </a:rPr>
-              <a:t>started</a:t>
-            </a:r>
-            <a:r>
-              <a:rPr lang="en-GB" i="1" dirty="0">
-                <a:solidFill>
-                  <a:schemeClr val="tx1"/>
-                </a:solidFill>
-              </a:rPr>
-              <a:t> </a:t>
-            </a:r>
-          </a:p>
-          <a:p>
-            <a:pPr lvl="2"/>
-            <a:r>
-              <a:rPr lang="en-GB" dirty="0">
-                <a:solidFill>
-                  <a:schemeClr val="tx1"/>
-                </a:solidFill>
-              </a:rPr>
-              <a:t>creation of the adjacency matrix of the graph</a:t>
-            </a:r>
-          </a:p>
-          <a:p>
-            <a:endParaRPr lang="en-GB" dirty="0"/>
+              <a:t>Dijkstra algorithm</a:t>
+            </a:r>
+            <a:endParaRPr lang="en-GB" b="1" i="1" dirty="0">
+              <a:solidFill>
+                <a:schemeClr val="tx1"/>
+              </a:solidFill>
+            </a:endParaRPr>
           </a:p>
         </p:txBody>
       </p:sp>

</xml_diff>